<commit_message>
Adding image and  encrytedimage
</commit_message>
<xml_diff>
--- a/AICTE PPT Template.pptx
+++ b/AICTE PPT Template.pptx
@@ -136,12 +136,20 @@
 </p:presentation>
 </file>
 
+<file path=ppt/revisionInfo.xml><?xml version="1.0" encoding="utf-8"?>
+<p1510:revInfo xmlns:a="http://schemas.openxmlformats.org/drawingml/2006/main" xmlns:r="http://schemas.openxmlformats.org/officeDocument/2006/relationships" xmlns:p1510="http://schemas.microsoft.com/office/powerpoint/2015/10/main">
+  <p1510:revLst>
+    <p1510:client id="{807ADCD6-4435-4C63-B709-E826989E0F2B}" v="6" dt="2025-02-25T18:29:09.830"/>
+  </p1510:revLst>
+</p1510:revInfo>
+</file>
+
 <file path=ppt/changesInfos/changesInfo1.xml><?xml version="1.0" encoding="utf-8"?>
 <pc:chgInfo xmlns:a="http://schemas.openxmlformats.org/drawingml/2006/main" xmlns:r="http://schemas.openxmlformats.org/officeDocument/2006/relationships" xmlns:ac="http://schemas.microsoft.com/office/drawing/2013/main/command" xmlns:pc="http://schemas.microsoft.com/office/powerpoint/2013/main/command">
   <pc:docChgLst>
     <pc:chgData name="Sumit Rohila" userId="a8497c857d5d2791" providerId="LiveId" clId="{807ADCD6-4435-4C63-B709-E826989E0F2B}"/>
-    <pc:docChg chg="undo custSel modSld">
-      <pc:chgData name="Sumit Rohila" userId="a8497c857d5d2791" providerId="LiveId" clId="{807ADCD6-4435-4C63-B709-E826989E0F2B}" dt="2025-02-24T21:35:38.827" v="142" actId="1076"/>
+    <pc:docChg chg="undo redo custSel modSld">
+      <pc:chgData name="Sumit Rohila" userId="a8497c857d5d2791" providerId="LiveId" clId="{807ADCD6-4435-4C63-B709-E826989E0F2B}" dt="2025-02-25T18:29:18.592" v="254" actId="1076"/>
       <pc:docMkLst>
         <pc:docMk/>
       </pc:docMkLst>
@@ -160,20 +168,115 @@
           </ac:spMkLst>
         </pc:spChg>
       </pc:sldChg>
-      <pc:sldChg chg="modSp mod">
-        <pc:chgData name="Sumit Rohila" userId="a8497c857d5d2791" providerId="LiveId" clId="{807ADCD6-4435-4C63-B709-E826989E0F2B}" dt="2025-02-24T21:35:38.827" v="142" actId="1076"/>
+      <pc:sldChg chg="addSp delSp modSp mod">
+        <pc:chgData name="Sumit Rohila" userId="a8497c857d5d2791" providerId="LiveId" clId="{807ADCD6-4435-4C63-B709-E826989E0F2B}" dt="2025-02-25T18:29:18.592" v="254" actId="1076"/>
         <pc:sldMkLst>
           <pc:docMk/>
           <pc:sldMk cId="2083715239" sldId="2146847060"/>
         </pc:sldMkLst>
-        <pc:picChg chg="mod">
-          <ac:chgData name="Sumit Rohila" userId="a8497c857d5d2791" providerId="LiveId" clId="{807ADCD6-4435-4C63-B709-E826989E0F2B}" dt="2025-02-24T21:35:38.827" v="142" actId="1076"/>
+        <pc:spChg chg="add del mod">
+          <ac:chgData name="Sumit Rohila" userId="a8497c857d5d2791" providerId="LiveId" clId="{807ADCD6-4435-4C63-B709-E826989E0F2B}" dt="2025-02-25T18:27:58.056" v="236" actId="478"/>
+          <ac:spMkLst>
+            <pc:docMk/>
+            <pc:sldMk cId="2083715239" sldId="2146847060"/>
+            <ac:spMk id="10" creationId="{25079802-1AD9-E9B2-27B8-E69E9F7D6367}"/>
+          </ac:spMkLst>
+        </pc:spChg>
+        <pc:picChg chg="add del">
+          <ac:chgData name="Sumit Rohila" userId="a8497c857d5d2791" providerId="LiveId" clId="{807ADCD6-4435-4C63-B709-E826989E0F2B}" dt="2025-02-25T18:27:12.698" v="224" actId="478"/>
+          <ac:picMkLst>
+            <pc:docMk/>
+            <pc:sldMk cId="2083715239" sldId="2146847060"/>
+            <ac:picMk id="4" creationId="{F10AAFB9-39A5-1BDB-375A-E945BEBC9F01}"/>
+          </ac:picMkLst>
+        </pc:picChg>
+        <pc:picChg chg="add del mod">
+          <ac:chgData name="Sumit Rohila" userId="a8497c857d5d2791" providerId="LiveId" clId="{807ADCD6-4435-4C63-B709-E826989E0F2B}" dt="2025-02-25T18:27:12.888" v="225" actId="478"/>
           <ac:picMkLst>
             <pc:docMk/>
             <pc:sldMk cId="2083715239" sldId="2146847060"/>
             <ac:picMk id="5" creationId="{177F6DC6-BA4D-D7FF-AC91-EB000F94255B}"/>
           </ac:picMkLst>
         </pc:picChg>
+        <pc:picChg chg="del">
+          <ac:chgData name="Sumit Rohila" userId="a8497c857d5d2791" providerId="LiveId" clId="{807ADCD6-4435-4C63-B709-E826989E0F2B}" dt="2025-02-25T18:25:57.628" v="205" actId="478"/>
+          <ac:picMkLst>
+            <pc:docMk/>
+            <pc:sldMk cId="2083715239" sldId="2146847060"/>
+            <ac:picMk id="6" creationId="{CDE6BCAD-5739-F814-FE1B-31020A241FCA}"/>
+          </ac:picMkLst>
+        </pc:picChg>
+        <pc:picChg chg="add del">
+          <ac:chgData name="Sumit Rohila" userId="a8497c857d5d2791" providerId="LiveId" clId="{807ADCD6-4435-4C63-B709-E826989E0F2B}" dt="2025-02-25T18:27:50.160" v="234" actId="478"/>
+          <ac:picMkLst>
+            <pc:docMk/>
+            <pc:sldMk cId="2083715239" sldId="2146847060"/>
+            <ac:picMk id="7" creationId="{E0CF9235-006C-5D73-5C53-BD5AAAAAE776}"/>
+          </ac:picMkLst>
+        </pc:picChg>
+        <pc:picChg chg="add del mod">
+          <ac:chgData name="Sumit Rohila" userId="a8497c857d5d2791" providerId="LiveId" clId="{807ADCD6-4435-4C63-B709-E826989E0F2B}" dt="2025-02-25T18:27:51.969" v="235" actId="478"/>
+          <ac:picMkLst>
+            <pc:docMk/>
+            <pc:sldMk cId="2083715239" sldId="2146847060"/>
+            <ac:picMk id="8" creationId="{4BF20D91-8245-55FE-A718-9D56A4E68C20}"/>
+          </ac:picMkLst>
+        </pc:picChg>
+        <pc:picChg chg="add mod">
+          <ac:chgData name="Sumit Rohila" userId="a8497c857d5d2791" providerId="LiveId" clId="{807ADCD6-4435-4C63-B709-E826989E0F2B}" dt="2025-02-25T18:28:52.181" v="248" actId="1076"/>
+          <ac:picMkLst>
+            <pc:docMk/>
+            <pc:sldMk cId="2083715239" sldId="2146847060"/>
+            <ac:picMk id="12" creationId="{A974C238-BD00-90E3-25FA-CBF7D4E0266A}"/>
+          </ac:picMkLst>
+        </pc:picChg>
+        <pc:picChg chg="add mod">
+          <ac:chgData name="Sumit Rohila" userId="a8497c857d5d2791" providerId="LiveId" clId="{807ADCD6-4435-4C63-B709-E826989E0F2B}" dt="2025-02-25T18:29:01.013" v="251" actId="14100"/>
+          <ac:picMkLst>
+            <pc:docMk/>
+            <pc:sldMk cId="2083715239" sldId="2146847060"/>
+            <ac:picMk id="14" creationId="{9DDC4814-2FA6-F112-8E17-4DFD24486CA3}"/>
+          </ac:picMkLst>
+        </pc:picChg>
+        <pc:picChg chg="add mod">
+          <ac:chgData name="Sumit Rohila" userId="a8497c857d5d2791" providerId="LiveId" clId="{807ADCD6-4435-4C63-B709-E826989E0F2B}" dt="2025-02-25T18:29:18.592" v="254" actId="1076"/>
+          <ac:picMkLst>
+            <pc:docMk/>
+            <pc:sldMk cId="2083715239" sldId="2146847060"/>
+            <ac:picMk id="16" creationId="{BF190C7D-71A0-FEF7-108F-DF64D0FC01AC}"/>
+          </ac:picMkLst>
+        </pc:picChg>
+      </pc:sldChg>
+      <pc:sldChg chg="addSp delSp modSp mod">
+        <pc:chgData name="Sumit Rohila" userId="a8497c857d5d2791" providerId="LiveId" clId="{807ADCD6-4435-4C63-B709-E826989E0F2B}" dt="2025-02-25T17:01:52.070" v="204" actId="1076"/>
+        <pc:sldMkLst>
+          <pc:docMk/>
+          <pc:sldMk cId="2230664768" sldId="2146847061"/>
+        </pc:sldMkLst>
+        <pc:spChg chg="del mod">
+          <ac:chgData name="Sumit Rohila" userId="a8497c857d5d2791" providerId="LiveId" clId="{807ADCD6-4435-4C63-B709-E826989E0F2B}" dt="2025-02-25T17:00:17.511" v="199" actId="478"/>
+          <ac:spMkLst>
+            <pc:docMk/>
+            <pc:sldMk cId="2230664768" sldId="2146847061"/>
+            <ac:spMk id="3" creationId="{51A299DD-46FA-7866-41D8-C1BFCC2F69DD}"/>
+          </ac:spMkLst>
+        </pc:spChg>
+        <pc:spChg chg="add del mod">
+          <ac:chgData name="Sumit Rohila" userId="a8497c857d5d2791" providerId="LiveId" clId="{807ADCD6-4435-4C63-B709-E826989E0F2B}" dt="2025-02-25T17:00:22.903" v="201" actId="478"/>
+          <ac:spMkLst>
+            <pc:docMk/>
+            <pc:sldMk cId="2230664768" sldId="2146847061"/>
+            <ac:spMk id="4" creationId="{6022F804-F65A-24D8-A91B-388BF9CE607D}"/>
+          </ac:spMkLst>
+        </pc:spChg>
+        <pc:spChg chg="add mod">
+          <ac:chgData name="Sumit Rohila" userId="a8497c857d5d2791" providerId="LiveId" clId="{807ADCD6-4435-4C63-B709-E826989E0F2B}" dt="2025-02-25T17:01:52.070" v="204" actId="1076"/>
+          <ac:spMkLst>
+            <pc:docMk/>
+            <pc:sldMk cId="2230664768" sldId="2146847061"/>
+            <ac:spMk id="6" creationId="{BDF1C640-69E8-E6D9-41F1-BDA395F480BF}"/>
+          </ac:spMkLst>
+        </pc:spChg>
       </pc:sldChg>
     </pc:docChg>
   </pc:docChgLst>
@@ -5791,19 +5894,17 @@
       </p:sp>
       <p:pic>
         <p:nvPicPr>
-          <p:cNvPr id="5" name="Content Placeholder 4" descr="A screenshot of a computer&#10;&#10;AI-generated content may be incorrect.">
+          <p:cNvPr id="12" name="Picture 11">
             <a:extLst>
               <a:ext uri="{FF2B5EF4-FFF2-40B4-BE49-F238E27FC236}">
-                <a16:creationId xmlns:a16="http://schemas.microsoft.com/office/drawing/2014/main" id="{177F6DC6-BA4D-D7FF-AC91-EB000F94255B}"/>
+                <a16:creationId xmlns:a16="http://schemas.microsoft.com/office/drawing/2014/main" id="{A974C238-BD00-90E3-25FA-CBF7D4E0266A}"/>
               </a:ext>
             </a:extLst>
           </p:cNvPr>
           <p:cNvPicPr>
-            <a:picLocks noGrp="1" noChangeAspect="1"/>
+            <a:picLocks noChangeAspect="1"/>
           </p:cNvPicPr>
-          <p:nvPr>
-            <p:ph idx="1"/>
-          </p:nvPr>
+          <p:nvPr/>
         </p:nvPicPr>
         <p:blipFill>
           <a:blip r:embed="rId2"/>
@@ -5813,17 +5914,20 @@
         </p:blipFill>
         <p:spPr>
           <a:xfrm>
-            <a:off x="581192" y="1232452"/>
-            <a:ext cx="4385095" cy="2349026"/>
+            <a:off x="259883" y="1232452"/>
+            <a:ext cx="4880008" cy="2822640"/>
           </a:xfrm>
+          <a:prstGeom prst="rect">
+            <a:avLst/>
+          </a:prstGeom>
         </p:spPr>
       </p:pic>
       <p:pic>
         <p:nvPicPr>
-          <p:cNvPr id="4" name="Picture 3" descr="A screenshot of a computer&#10;&#10;AI-generated content may be incorrect.">
+          <p:cNvPr id="14" name="Picture 13">
             <a:extLst>
               <a:ext uri="{FF2B5EF4-FFF2-40B4-BE49-F238E27FC236}">
-                <a16:creationId xmlns:a16="http://schemas.microsoft.com/office/drawing/2014/main" id="{F10AAFB9-39A5-1BDB-375A-E945BEBC9F01}"/>
+                <a16:creationId xmlns:a16="http://schemas.microsoft.com/office/drawing/2014/main" id="{9DDC4814-2FA6-F112-8E17-4DFD24486CA3}"/>
               </a:ext>
             </a:extLst>
           </p:cNvPr>
@@ -5834,13 +5938,14 @@
         </p:nvPicPr>
         <p:blipFill>
           <a:blip r:embed="rId3"/>
-          <a:srcRect l="-2361" r="-4250" b="-2586"/>
-          <a:stretch/>
+          <a:stretch>
+            <a:fillRect/>
+          </a:stretch>
         </p:blipFill>
         <p:spPr>
           <a:xfrm>
-            <a:off x="6282905" y="993711"/>
-            <a:ext cx="5680083" cy="2862467"/>
+            <a:off x="5461200" y="702156"/>
+            <a:ext cx="5694479" cy="1799925"/>
           </a:xfrm>
           <a:prstGeom prst="rect">
             <a:avLst/>
@@ -5849,10 +5954,10 @@
       </p:pic>
       <p:pic>
         <p:nvPicPr>
-          <p:cNvPr id="6" name="Picture 5" descr="A screenshot of a computer&#10;&#10;AI-generated content may be incorrect.">
+          <p:cNvPr id="16" name="Picture 15">
             <a:extLst>
               <a:ext uri="{FF2B5EF4-FFF2-40B4-BE49-F238E27FC236}">
-                <a16:creationId xmlns:a16="http://schemas.microsoft.com/office/drawing/2014/main" id="{CDE6BCAD-5739-F814-FE1B-31020A241FCA}"/>
+                <a16:creationId xmlns:a16="http://schemas.microsoft.com/office/drawing/2014/main" id="{BF190C7D-71A0-FEF7-108F-DF64D0FC01AC}"/>
               </a:ext>
             </a:extLst>
           </p:cNvPr>
@@ -5869,38 +5974,8 @@
         </p:blipFill>
         <p:spPr>
           <a:xfrm>
-            <a:off x="244415" y="3854805"/>
-            <a:ext cx="5218981" cy="2843370"/>
-          </a:xfrm>
-          <a:prstGeom prst="rect">
-            <a:avLst/>
-          </a:prstGeom>
-        </p:spPr>
-      </p:pic>
-      <p:pic>
-        <p:nvPicPr>
-          <p:cNvPr id="7" name="Picture 6" descr="A screenshot of a computer&#10;&#10;AI-generated content may be incorrect.">
-            <a:extLst>
-              <a:ext uri="{FF2B5EF4-FFF2-40B4-BE49-F238E27FC236}">
-                <a16:creationId xmlns:a16="http://schemas.microsoft.com/office/drawing/2014/main" id="{E0CF9235-006C-5D73-5C53-BD5AAAAAE776}"/>
-              </a:ext>
-            </a:extLst>
-          </p:cNvPr>
-          <p:cNvPicPr>
-            <a:picLocks noChangeAspect="1"/>
-          </p:cNvPicPr>
-          <p:nvPr/>
-        </p:nvPicPr>
-        <p:blipFill>
-          <a:blip r:embed="rId5"/>
-          <a:stretch>
-            <a:fillRect/>
-          </a:stretch>
-        </p:blipFill>
-        <p:spPr>
-          <a:xfrm>
-            <a:off x="6771736" y="3854805"/>
-            <a:ext cx="5190227" cy="2843371"/>
+            <a:off x="5280707" y="2536258"/>
+            <a:ext cx="6651410" cy="3486878"/>
           </a:xfrm>
           <a:prstGeom prst="rect">
             <a:avLst/>
@@ -6257,41 +6332,10 @@
       </p:sp>
       <p:sp>
         <p:nvSpPr>
-          <p:cNvPr id="3" name="Content Placeholder 2">
+          <p:cNvPr id="6" name="TextBox 5">
             <a:extLst>
               <a:ext uri="{FF2B5EF4-FFF2-40B4-BE49-F238E27FC236}">
-                <a16:creationId xmlns:a16="http://schemas.microsoft.com/office/drawing/2014/main" id="{51A299DD-46FA-7866-41D8-C1BFCC2F69DD}"/>
-              </a:ext>
-            </a:extLst>
-          </p:cNvPr>
-          <p:cNvSpPr>
-            <a:spLocks noGrp="1"/>
-          </p:cNvSpPr>
-          <p:nvPr>
-            <p:ph idx="1"/>
-          </p:nvPr>
-        </p:nvSpPr>
-        <p:spPr/>
-        <p:txBody>
-          <a:bodyPr/>
-          <a:lstStyle/>
-          <a:p>
-            <a:pPr marL="0" indent="0">
-              <a:buNone/>
-            </a:pPr>
-            <a:endParaRPr lang="en-IN" dirty="0">
-              <a:ea typeface="+mn-lt"/>
-              <a:cs typeface="+mn-lt"/>
-            </a:endParaRPr>
-          </a:p>
-        </p:txBody>
-      </p:sp>
-      <p:sp>
-        <p:nvSpPr>
-          <p:cNvPr id="4" name="TextBox 3">
-            <a:extLst>
-              <a:ext uri="{FF2B5EF4-FFF2-40B4-BE49-F238E27FC236}">
-                <a16:creationId xmlns:a16="http://schemas.microsoft.com/office/drawing/2014/main" id="{6022F804-F65A-24D8-A91B-388BF9CE607D}"/>
+                <a16:creationId xmlns:a16="http://schemas.microsoft.com/office/drawing/2014/main" id="{BDF1C640-69E8-E6D9-41F1-BDA395F480BF}"/>
               </a:ext>
             </a:extLst>
           </p:cNvPr>
@@ -6300,8 +6344,8 @@
         </p:nvSpPr>
         <p:spPr>
           <a:xfrm>
-            <a:off x="583721" y="2567796"/>
-            <a:ext cx="10708255" cy="369332"/>
+            <a:off x="751115" y="2264228"/>
+            <a:ext cx="8349343" cy="369332"/>
           </a:xfrm>
           <a:prstGeom prst="rect">
             <a:avLst/>
@@ -6309,21 +6353,18 @@
           <a:noFill/>
         </p:spPr>
         <p:txBody>
-          <a:bodyPr rot="0" spcFirstLastPara="0" vertOverflow="overflow" horzOverflow="overflow" vert="horz" wrap="square" lIns="91440" tIns="45720" rIns="91440" bIns="45720" numCol="1" spcCol="0" rtlCol="0" fromWordArt="0" anchor="t" anchorCtr="0" forceAA="0" compatLnSpc="1">
-            <a:prstTxWarp prst="textNoShape">
-              <a:avLst/>
-            </a:prstTxWarp>
+          <a:bodyPr wrap="square">
             <a:spAutoFit/>
           </a:bodyPr>
           <a:lstStyle/>
           <a:p>
             <a:r>
-              <a:rPr lang="en-US" dirty="0">
-                <a:hlinkClick r:id="" action="ppaction://noaction"/>
+              <a:rPr lang="en-IN" dirty="0">
+                <a:hlinkClick r:id="rId2"/>
               </a:rPr>
-              <a:t>https://github.com/satyam2003-cpu/myproject.git</a:t>
-            </a:r>
-            <a:endParaRPr lang="en-US"/>
+              <a:t>https://github.com/sumitcodes007/stegnographyproject.git</a:t>
+            </a:r>
+            <a:endParaRPr lang="en-IN" dirty="0"/>
           </a:p>
         </p:txBody>
       </p:sp>
@@ -6905,11 +6946,12 @@
 </file>
 
 <file path=customXml/item1.xml><?xml version="1.0" encoding="utf-8"?>
-<p:properties xmlns:p="http://schemas.microsoft.com/office/2006/metadata/properties" xmlns:xsi="http://www.w3.org/2001/XMLSchema-instance" xmlns:pc="http://schemas.microsoft.com/office/infopath/2007/PartnerControls">
-  <documentManagement>
-    <_activity xmlns="b30265f8-c5e2-4918-b4a1-b977299ca3e2" xsi:nil="true"/>
-  </documentManagement>
-</p:properties>
+<?mso-contentType ?>
+<FormTemplates xmlns="http://schemas.microsoft.com/sharepoint/v3/contenttype/forms">
+  <Display>DocumentLibraryForm</Display>
+  <Edit>DocumentLibraryForm</Edit>
+  <New>DocumentLibraryForm</New>
+</FormTemplates>
 </file>
 
 <file path=customXml/item2.xml><?xml version="1.0" encoding="utf-8"?>
@@ -7146,27 +7188,17 @@
 </file>
 
 <file path=customXml/item3.xml><?xml version="1.0" encoding="utf-8"?>
-<?mso-contentType ?>
-<FormTemplates xmlns="http://schemas.microsoft.com/sharepoint/v3/contenttype/forms">
-  <Display>DocumentLibraryForm</Display>
-  <Edit>DocumentLibraryForm</Edit>
-  <New>DocumentLibraryForm</New>
-</FormTemplates>
+<p:properties xmlns:p="http://schemas.microsoft.com/office/2006/metadata/properties" xmlns:xsi="http://www.w3.org/2001/XMLSchema-instance" xmlns:pc="http://schemas.microsoft.com/office/infopath/2007/PartnerControls">
+  <documentManagement>
+    <_activity xmlns="b30265f8-c5e2-4918-b4a1-b977299ca3e2" xsi:nil="true"/>
+  </documentManagement>
+</p:properties>
 </file>
 
 <file path=customXml/itemProps1.xml><?xml version="1.0" encoding="utf-8"?>
-<ds:datastoreItem xmlns:ds="http://schemas.openxmlformats.org/officeDocument/2006/customXml" ds:itemID="{8D289AE2-D2AE-49D1-AFAC-3A79F6794255}">
+<ds:datastoreItem xmlns:ds="http://schemas.openxmlformats.org/officeDocument/2006/customXml" ds:itemID="{927BD4C1-B6B1-4715-ABF9-E660A51A4EA0}">
   <ds:schemaRefs>
-    <ds:schemaRef ds:uri="http://schemas.openxmlformats.org/package/2006/metadata/core-properties"/>
-    <ds:schemaRef ds:uri="http://schemas.microsoft.com/office/2006/documentManagement/types"/>
-    <ds:schemaRef ds:uri="http://purl.org/dc/dcmitype/"/>
-    <ds:schemaRef ds:uri="http://schemas.microsoft.com/office/infopath/2007/PartnerControls"/>
-    <ds:schemaRef ds:uri="http://purl.org/dc/elements/1.1/"/>
-    <ds:schemaRef ds:uri="http://schemas.microsoft.com/office/2006/metadata/properties"/>
-    <ds:schemaRef ds:uri="fadb41d3-f9cb-40fb-903c-8cacaba95bb5"/>
-    <ds:schemaRef ds:uri="http://purl.org/dc/terms/"/>
-    <ds:schemaRef ds:uri="b30265f8-c5e2-4918-b4a1-b977299ca3e2"/>
-    <ds:schemaRef ds:uri="http://www.w3.org/XML/1998/namespace"/>
+    <ds:schemaRef ds:uri="http://schemas.microsoft.com/sharepoint/v3/contenttype/forms"/>
   </ds:schemaRefs>
 </ds:datastoreItem>
 </file>
@@ -7191,9 +7223,18 @@
 </file>
 
 <file path=customXml/itemProps3.xml><?xml version="1.0" encoding="utf-8"?>
-<ds:datastoreItem xmlns:ds="http://schemas.openxmlformats.org/officeDocument/2006/customXml" ds:itemID="{927BD4C1-B6B1-4715-ABF9-E660A51A4EA0}">
+<ds:datastoreItem xmlns:ds="http://schemas.openxmlformats.org/officeDocument/2006/customXml" ds:itemID="{8D289AE2-D2AE-49D1-AFAC-3A79F6794255}">
   <ds:schemaRefs>
-    <ds:schemaRef ds:uri="http://schemas.microsoft.com/sharepoint/v3/contenttype/forms"/>
+    <ds:schemaRef ds:uri="http://schemas.openxmlformats.org/package/2006/metadata/core-properties"/>
+    <ds:schemaRef ds:uri="http://schemas.microsoft.com/office/2006/documentManagement/types"/>
+    <ds:schemaRef ds:uri="http://purl.org/dc/dcmitype/"/>
+    <ds:schemaRef ds:uri="http://schemas.microsoft.com/office/infopath/2007/PartnerControls"/>
+    <ds:schemaRef ds:uri="http://purl.org/dc/elements/1.1/"/>
+    <ds:schemaRef ds:uri="http://schemas.microsoft.com/office/2006/metadata/properties"/>
+    <ds:schemaRef ds:uri="fadb41d3-f9cb-40fb-903c-8cacaba95bb5"/>
+    <ds:schemaRef ds:uri="http://purl.org/dc/terms/"/>
+    <ds:schemaRef ds:uri="b30265f8-c5e2-4918-b4a1-b977299ca3e2"/>
+    <ds:schemaRef ds:uri="http://www.w3.org/XML/1998/namespace"/>
   </ds:schemaRefs>
 </ds:datastoreItem>
 </file>
</xml_diff>